<commit_message>
Small fix to presentation
Fixed some small mistakes in my powerpoint. Added last slide called 'Opsummering'.
</commit_message>
<xml_diff>
--- a/Eksamensprojekt - Max/Præsentation/Præsentation af eksamensprojekt.pptx
+++ b/Eksamensprojekt - Max/Præsentation/Præsentation af eksamensprojekt.pptx
@@ -6,10 +6,10 @@
     <p:sldMasterId id="2147483698" r:id="rId2"/>
   </p:sldMasterIdLst>
   <p:notesMasterIdLst>
-    <p:notesMasterId r:id="rId11"/>
+    <p:notesMasterId r:id="rId12"/>
   </p:notesMasterIdLst>
   <p:handoutMasterIdLst>
-    <p:handoutMasterId r:id="rId12"/>
+    <p:handoutMasterId r:id="rId13"/>
   </p:handoutMasterIdLst>
   <p:sldIdLst>
     <p:sldId id="256" r:id="rId3"/>
@@ -20,6 +20,7 @@
     <p:sldId id="262" r:id="rId8"/>
     <p:sldId id="263" r:id="rId9"/>
     <p:sldId id="264" r:id="rId10"/>
+    <p:sldId id="265" r:id="rId11"/>
   </p:sldIdLst>
   <p:sldSz cx="12192000" cy="6858000"/>
   <p:notesSz cx="6858000" cy="9144000"/>
@@ -123,7 +124,12 @@
       <p15:sldGuideLst xmlns:p15="http://schemas.microsoft.com/office/powerpoint/2012/main">
         <p15:guide id="1" pos="3840" userDrawn="1">
           <p15:clr>
-            <a:srgbClr val="A4A3A4"/>
+            <a:srgbClr val="5ACBF0"/>
+          </p15:clr>
+        </p15:guide>
+        <p15:guide id="2" orient="horz" pos="2160" userDrawn="1">
+          <p15:clr>
+            <a:srgbClr val="5ACBF0"/>
           </p15:clr>
         </p15:guide>
       </p15:sldGuideLst>
@@ -134,7 +140,7 @@
 
 <file path=ppt/commentAuthors.xml><?xml version="1.0" encoding="utf-8"?>
 <p:cmAuthorLst xmlns:a="http://schemas.openxmlformats.org/drawingml/2006/main" xmlns:r="http://schemas.openxmlformats.org/officeDocument/2006/relationships" xmlns:p="http://schemas.openxmlformats.org/presentationml/2006/main">
-  <p:cmAuthor id="1" name="Max Hansen" initials="MH" lastIdx="3" clrIdx="0">
+  <p:cmAuthor id="1" name="Max Hansen" initials="MH" lastIdx="4" clrIdx="0">
     <p:extLst>
       <p:ext uri="{19B8F6BF-5375-455C-9EA6-DF929625EA0E}">
         <p15:presenceInfo xmlns:p15="http://schemas.microsoft.com/office/powerpoint/2012/main" userId="788b532f834497d9" providerId="Windows Live"/>
@@ -150,20 +156,6 @@
     <p:pos x="5213" y="2502"/>
     <p:text>Max Hansen	10-06-2020
 Flowdiagram</p:text>
-    <p:extLst>
-      <p:ext uri="{C676402C-5697-4E1C-873F-D02D1690AC5C}">
-        <p15:threadingInfo xmlns:p15="http://schemas.microsoft.com/office/powerpoint/2012/main" timeZoneBias="-120"/>
-      </p:ext>
-    </p:extLst>
-  </p:cm>
-</p:cmLst>
-</file>
-
-<file path=ppt/comments/comment2.xml><?xml version="1.0" encoding="utf-8"?>
-<p:cmLst xmlns:a="http://schemas.openxmlformats.org/drawingml/2006/main" xmlns:r="http://schemas.openxmlformats.org/officeDocument/2006/relationships" xmlns:p="http://schemas.openxmlformats.org/presentationml/2006/main">
-  <p:cm authorId="1" dt="2020-06-17T10:20:49.261" idx="3">
-    <p:pos x="6868" y="1259"/>
-    <p:text>HUSK AT VERIFY_PASSWORD OG HASH_PASSWORD ER FRA NETTET</p:text>
     <p:extLst>
       <p:ext uri="{C676402C-5697-4E1C-873F-D02D1690AC5C}">
         <p15:threadingInfo xmlns:p15="http://schemas.microsoft.com/office/powerpoint/2012/main" timeZoneBias="-120"/>
@@ -267,7 +259,7 @@
           <a:p>
             <a:fld id="{496FCD50-C1A0-482B-BC86-90B92CB2FE42}" type="datetimeFigureOut">
               <a:rPr lang="da-DK" smtClean="0"/>
-              <a:t>18-06-2020</a:t>
+              <a:t>21-06-2020</a:t>
             </a:fld>
             <a:endParaRPr lang="da-DK"/>
           </a:p>
@@ -445,7 +437,7 @@
           <a:p>
             <a:fld id="{86FDA1C0-1334-4D8B-BA9D-24D0A591AB05}" type="datetimeFigureOut">
               <a:rPr lang="da-DK" smtClean="0"/>
-              <a:t>18-06-2020</a:t>
+              <a:t>21-06-2020</a:t>
             </a:fld>
             <a:endParaRPr lang="da-DK"/>
           </a:p>
@@ -5405,7 +5397,7 @@
           <a:p>
             <a:fld id="{FF082D74-0F04-403B-AC9F-887F607CB20D}" type="datetimeFigureOut">
               <a:rPr lang="en-US" smtClean="0"/>
-              <a:t>6/18/2020</a:t>
+              <a:t>6/21/2020</a:t>
             </a:fld>
             <a:endParaRPr lang="en-US"/>
           </a:p>
@@ -15236,7 +15228,7 @@
           <a:p>
             <a:fld id="{FF082D74-0F04-403B-AC9F-887F607CB20D}" type="datetimeFigureOut">
               <a:rPr lang="en-US" smtClean="0"/>
-              <a:t>6/18/2020</a:t>
+              <a:t>6/21/2020</a:t>
             </a:fld>
             <a:endParaRPr lang="en-US"/>
           </a:p>
@@ -20094,7 +20086,7 @@
             </a:pPr>
             <a:r>
               <a:rPr lang="da-DK" dirty="0"/>
-              <a:t>Fremvisning af programmet (Krav til program?)</a:t>
+              <a:t>Fremvisning af programmet </a:t>
             </a:r>
           </a:p>
           <a:p>
@@ -20104,7 +20096,7 @@
             </a:pPr>
             <a:r>
               <a:rPr lang="da-DK" dirty="0"/>
-              <a:t>Kravene til programmet (Fremvisning?)</a:t>
+              <a:t>Kravene til programmet </a:t>
             </a:r>
           </a:p>
           <a:p>
@@ -20262,8 +20254,8 @@
         </p:nvSpPr>
         <p:spPr>
           <a:xfrm>
-            <a:off x="5240322" y="357793"/>
-            <a:ext cx="1711355" cy="588220"/>
+            <a:off x="5249031" y="357793"/>
+            <a:ext cx="1711355" cy="530481"/>
           </a:xfrm>
           <a:prstGeom prst="roundRect">
             <a:avLst/>
@@ -20441,7 +20433,7 @@
         </p:nvSpPr>
         <p:spPr>
           <a:xfrm>
-            <a:off x="404088" y="351187"/>
+            <a:off x="421506" y="351187"/>
             <a:ext cx="11363111" cy="588220"/>
           </a:xfrm>
         </p:spPr>
@@ -20906,8 +20898,8 @@
         </p:nvSpPr>
         <p:spPr>
           <a:xfrm>
-            <a:off x="1661020" y="116735"/>
-            <a:ext cx="8061820" cy="655782"/>
+            <a:off x="2447109" y="200297"/>
+            <a:ext cx="7254240" cy="478972"/>
           </a:xfrm>
           <a:prstGeom prst="roundRect">
             <a:avLst/>
@@ -20967,7 +20959,7 @@
         </p:nvSpPr>
         <p:spPr>
           <a:xfrm>
-            <a:off x="0" y="150813"/>
+            <a:off x="383193" y="150813"/>
             <a:ext cx="11363325" cy="587375"/>
           </a:xfrm>
           <a:prstGeom prst="rect">
@@ -20982,7 +20974,9 @@
               <a:buNone/>
             </a:pPr>
             <a:r>
-              <a:rPr lang="da-DK" sz="3600" dirty="0"/>
+              <a:rPr lang="da-DK" sz="3600" dirty="0">
+                <a:latin typeface="+mj-lt"/>
+              </a:rPr>
               <a:t>Begrundelse for design – Hoved skærm </a:t>
             </a:r>
           </a:p>
@@ -21074,8 +21068,8 @@
         </p:nvSpPr>
         <p:spPr>
           <a:xfrm>
-            <a:off x="2084398" y="284447"/>
-            <a:ext cx="8036237" cy="655782"/>
+            <a:off x="2525486" y="209001"/>
+            <a:ext cx="7158445" cy="513806"/>
           </a:xfrm>
           <a:prstGeom prst="roundRect">
             <a:avLst/>
@@ -21135,7 +21129,7 @@
         </p:nvSpPr>
         <p:spPr>
           <a:xfrm>
-            <a:off x="2084399" y="302520"/>
+            <a:off x="2084399" y="206721"/>
             <a:ext cx="8036238" cy="587375"/>
           </a:xfrm>
           <a:prstGeom prst="rect">
@@ -21150,7 +21144,9 @@
               <a:buNone/>
             </a:pPr>
             <a:r>
-              <a:rPr lang="da-DK" sz="3600" dirty="0"/>
+              <a:rPr lang="da-DK" sz="3600" dirty="0">
+                <a:latin typeface="+mj-lt"/>
+              </a:rPr>
               <a:t>Begrundelse for design – Login-system</a:t>
             </a:r>
           </a:p>
@@ -21227,7 +21223,7 @@
         </p:blipFill>
         <p:spPr>
           <a:xfrm>
-            <a:off x="6219963" y="1399835"/>
+            <a:off x="6368014" y="1399835"/>
             <a:ext cx="2305372" cy="3734321"/>
           </a:xfrm>
           <a:prstGeom prst="rect">
@@ -21269,7 +21265,7 @@
         </p:blipFill>
         <p:spPr>
           <a:xfrm>
-            <a:off x="8899172" y="2272950"/>
+            <a:off x="9143017" y="2272950"/>
             <a:ext cx="2305372" cy="3734321"/>
           </a:xfrm>
           <a:prstGeom prst="rect">
@@ -21370,8 +21366,8 @@
         </p:nvSpPr>
         <p:spPr>
           <a:xfrm>
-            <a:off x="521612" y="477775"/>
-            <a:ext cx="7466203" cy="655782"/>
+            <a:off x="486776" y="487680"/>
+            <a:ext cx="7466203" cy="548640"/>
           </a:xfrm>
           <a:prstGeom prst="roundRect">
             <a:avLst/>
@@ -21431,7 +21427,7 @@
         </p:nvSpPr>
         <p:spPr>
           <a:xfrm>
-            <a:off x="-1429638" y="520441"/>
+            <a:off x="-1464474" y="520441"/>
             <a:ext cx="11363111" cy="588220"/>
           </a:xfrm>
         </p:spPr>
@@ -21475,7 +21471,7 @@
         </p:blipFill>
         <p:spPr>
           <a:xfrm>
-            <a:off x="2983832" y="1545779"/>
+            <a:off x="2626780" y="1632867"/>
             <a:ext cx="6949641" cy="3612437"/>
           </a:xfrm>
           <a:prstGeom prst="rect">
@@ -21548,7 +21544,7 @@
         </p:blipFill>
         <p:spPr>
           <a:xfrm>
-            <a:off x="2483317" y="1731401"/>
+            <a:off x="2352686" y="1670440"/>
             <a:ext cx="7496977" cy="3522827"/>
           </a:xfrm>
           <a:prstGeom prst="rect">
@@ -21565,10 +21561,10 @@
       </p:pic>
       <p:sp>
         <p:nvSpPr>
-          <p:cNvPr id="5" name="Rektangel: afrundede hjørner 4">
-            <a:extLst>
-              <a:ext uri="{FF2B5EF4-FFF2-40B4-BE49-F238E27FC236}">
-                <a16:creationId xmlns:a16="http://schemas.microsoft.com/office/drawing/2014/main" id="{FD85D8D5-8769-4F0E-87B7-4A03AFAAB57E}"/>
+          <p:cNvPr id="10" name="Rektangel: afrundede hjørner 9">
+            <a:extLst>
+              <a:ext uri="{FF2B5EF4-FFF2-40B4-BE49-F238E27FC236}">
+                <a16:creationId xmlns:a16="http://schemas.microsoft.com/office/drawing/2014/main" id="{2D4C7A6A-0E31-4396-90D4-40BD750A17B6}"/>
               </a:ext>
             </a:extLst>
           </p:cNvPr>
@@ -21577,8 +21573,8 @@
         </p:nvSpPr>
         <p:spPr>
           <a:xfrm>
-            <a:off x="521612" y="477775"/>
-            <a:ext cx="7466203" cy="655782"/>
+            <a:off x="486776" y="487680"/>
+            <a:ext cx="7466203" cy="548640"/>
           </a:xfrm>
           <a:prstGeom prst="roundRect">
             <a:avLst/>
@@ -21622,10 +21618,10 @@
       </p:sp>
       <p:sp>
         <p:nvSpPr>
-          <p:cNvPr id="7" name="Pladsholder til tekst 2">
-            <a:extLst>
-              <a:ext uri="{FF2B5EF4-FFF2-40B4-BE49-F238E27FC236}">
-                <a16:creationId xmlns:a16="http://schemas.microsoft.com/office/drawing/2014/main" id="{E59C4222-18ED-42D7-BF71-5008343C689D}"/>
+          <p:cNvPr id="11" name="Pladsholder til tekst 2">
+            <a:extLst>
+              <a:ext uri="{FF2B5EF4-FFF2-40B4-BE49-F238E27FC236}">
+                <a16:creationId xmlns:a16="http://schemas.microsoft.com/office/drawing/2014/main" id="{71BEA228-F101-48B8-805C-04DA58F19249}"/>
               </a:ext>
             </a:extLst>
           </p:cNvPr>
@@ -21636,7 +21632,7 @@
         </p:nvSpPr>
         <p:spPr>
           <a:xfrm>
-            <a:off x="-1429638" y="520441"/>
+            <a:off x="-1464474" y="520441"/>
             <a:ext cx="11363111" cy="588220"/>
           </a:xfrm>
           <a:prstGeom prst="rect">
@@ -21812,9 +21808,10 @@
           <a:p>
             <a:pPr algn="ctr"/>
             <a:r>
-              <a:rPr lang="da-DK" dirty="0"/>
+              <a:rPr lang="da-DK"/>
               <a:t>Udførelsen af iteration 1 – Login-system</a:t>
             </a:r>
+            <a:endParaRPr lang="da-DK" dirty="0"/>
           </a:p>
         </p:txBody>
       </p:sp>
@@ -21862,8 +21859,8 @@
         </p:nvSpPr>
         <p:spPr>
           <a:xfrm>
-            <a:off x="521613" y="477775"/>
-            <a:ext cx="5511718" cy="655782"/>
+            <a:off x="487679" y="478970"/>
+            <a:ext cx="5364480" cy="487679"/>
           </a:xfrm>
           <a:prstGeom prst="roundRect">
             <a:avLst/>
@@ -21921,7 +21918,7 @@
         </p:nvSpPr>
         <p:spPr>
           <a:xfrm>
-            <a:off x="-2395313" y="511556"/>
+            <a:off x="-2525943" y="450595"/>
             <a:ext cx="11363111" cy="588220"/>
           </a:xfrm>
           <a:prstGeom prst="rect">
@@ -22176,6 +22173,704 @@
     <p:extLst>
       <p:ext uri="{BB962C8B-B14F-4D97-AF65-F5344CB8AC3E}">
         <p14:creationId xmlns:p14="http://schemas.microsoft.com/office/powerpoint/2010/main" val="73799061"/>
+      </p:ext>
+    </p:extLst>
+  </p:cSld>
+  <p:clrMapOvr>
+    <a:masterClrMapping/>
+  </p:clrMapOvr>
+</p:sld>
+</file>
+
+<file path=ppt/slides/slide9.xml><?xml version="1.0" encoding="utf-8"?>
+<p:sld xmlns:a="http://schemas.openxmlformats.org/drawingml/2006/main" xmlns:r="http://schemas.openxmlformats.org/officeDocument/2006/relationships" xmlns:p="http://schemas.openxmlformats.org/presentationml/2006/main">
+  <p:cSld>
+    <p:spTree>
+      <p:nvGrpSpPr>
+        <p:cNvPr id="1" name=""/>
+        <p:cNvGrpSpPr/>
+        <p:nvPr/>
+      </p:nvGrpSpPr>
+      <p:grpSpPr>
+        <a:xfrm>
+          <a:off x="0" y="0"/>
+          <a:ext cx="0" cy="0"/>
+          <a:chOff x="0" y="0"/>
+          <a:chExt cx="0" cy="0"/>
+        </a:xfrm>
+      </p:grpSpPr>
+      <p:sp>
+        <p:nvSpPr>
+          <p:cNvPr id="4" name="Rektangel: afrundede hjørner 3">
+            <a:extLst>
+              <a:ext uri="{FF2B5EF4-FFF2-40B4-BE49-F238E27FC236}">
+                <a16:creationId xmlns:a16="http://schemas.microsoft.com/office/drawing/2014/main" id="{590457F7-FDE2-497E-9229-F5C6B50D41AE}"/>
+              </a:ext>
+            </a:extLst>
+          </p:cNvPr>
+          <p:cNvSpPr/>
+          <p:nvPr/>
+        </p:nvSpPr>
+        <p:spPr>
+          <a:xfrm>
+            <a:off x="478972" y="480943"/>
+            <a:ext cx="2751908" cy="467013"/>
+          </a:xfrm>
+          <a:prstGeom prst="roundRect">
+            <a:avLst/>
+          </a:prstGeom>
+          <a:gradFill>
+            <a:gsLst>
+              <a:gs pos="0">
+                <a:srgbClr val="0070C0"/>
+              </a:gs>
+              <a:gs pos="50000">
+                <a:srgbClr val="0070C0"/>
+              </a:gs>
+              <a:gs pos="100000">
+                <a:srgbClr val="0070C0"/>
+              </a:gs>
+            </a:gsLst>
+          </a:gradFill>
+        </p:spPr>
+        <p:style>
+          <a:lnRef idx="0">
+            <a:schemeClr val="accent2"/>
+          </a:lnRef>
+          <a:fillRef idx="3">
+            <a:schemeClr val="accent2"/>
+          </a:fillRef>
+          <a:effectRef idx="3">
+            <a:schemeClr val="accent2"/>
+          </a:effectRef>
+          <a:fontRef idx="minor">
+            <a:schemeClr val="lt1"/>
+          </a:fontRef>
+        </p:style>
+        <p:txBody>
+          <a:bodyPr rtlCol="0" anchor="ctr"/>
+          <a:lstStyle/>
+          <a:p>
+            <a:pPr algn="ctr"/>
+            <a:endParaRPr lang="da-DK"/>
+          </a:p>
+        </p:txBody>
+      </p:sp>
+      <p:sp>
+        <p:nvSpPr>
+          <p:cNvPr id="3" name="Pladsholder til tekst 2">
+            <a:extLst>
+              <a:ext uri="{FF2B5EF4-FFF2-40B4-BE49-F238E27FC236}">
+                <a16:creationId xmlns:a16="http://schemas.microsoft.com/office/drawing/2014/main" id="{81BC9B14-DEF9-4AED-B81A-2F7DCD2C5553}"/>
+              </a:ext>
+            </a:extLst>
+          </p:cNvPr>
+          <p:cNvSpPr>
+            <a:spLocks noGrp="1"/>
+          </p:cNvSpPr>
+          <p:nvPr>
+            <p:ph type="body" sz="quarter" idx="10"/>
+          </p:nvPr>
+        </p:nvSpPr>
+        <p:spPr/>
+        <p:txBody>
+          <a:bodyPr/>
+          <a:lstStyle/>
+          <a:p>
+            <a:r>
+              <a:rPr lang="da-DK" dirty="0"/>
+              <a:t>Opsummering</a:t>
+            </a:r>
+          </a:p>
+        </p:txBody>
+      </p:sp>
+      <p:sp>
+        <p:nvSpPr>
+          <p:cNvPr id="5" name="Rektangel 4">
+            <a:extLst>
+              <a:ext uri="{FF2B5EF4-FFF2-40B4-BE49-F238E27FC236}">
+                <a16:creationId xmlns:a16="http://schemas.microsoft.com/office/drawing/2014/main" id="{7E34F098-89A8-4A6F-9A86-DDB26D41638C}"/>
+              </a:ext>
+            </a:extLst>
+          </p:cNvPr>
+          <p:cNvSpPr/>
+          <p:nvPr/>
+        </p:nvSpPr>
+        <p:spPr>
+          <a:xfrm>
+            <a:off x="1646693" y="1698450"/>
+            <a:ext cx="2417354" cy="2408166"/>
+          </a:xfrm>
+          <a:prstGeom prst="rect">
+            <a:avLst/>
+          </a:prstGeom>
+          <a:solidFill>
+            <a:schemeClr val="accent2">
+              <a:alpha val="50000"/>
+            </a:schemeClr>
+          </a:solidFill>
+          <a:ln>
+            <a:noFill/>
+          </a:ln>
+          <a:effectLst>
+            <a:outerShdw blurRad="50800" dist="38100" dir="2700000" algn="tl" rotWithShape="0">
+              <a:prstClr val="black">
+                <a:alpha val="40000"/>
+              </a:prstClr>
+            </a:outerShdw>
+          </a:effectLst>
+        </p:spPr>
+        <p:style>
+          <a:lnRef idx="0">
+            <a:scrgbClr r="0" g="0" b="0"/>
+          </a:lnRef>
+          <a:fillRef idx="0">
+            <a:scrgbClr r="0" g="0" b="0"/>
+          </a:fillRef>
+          <a:effectRef idx="0">
+            <a:scrgbClr r="0" g="0" b="0"/>
+          </a:effectRef>
+          <a:fontRef idx="minor">
+            <a:schemeClr val="lt1"/>
+          </a:fontRef>
+        </p:style>
+        <p:txBody>
+          <a:bodyPr rtlCol="0" anchor="ctr"/>
+          <a:lstStyle/>
+          <a:p>
+            <a:pPr algn="ctr"/>
+            <a:endParaRPr lang="da-DK" dirty="0"/>
+          </a:p>
+        </p:txBody>
+      </p:sp>
+      <p:sp>
+        <p:nvSpPr>
+          <p:cNvPr id="6" name="Rektangel 5">
+            <a:extLst>
+              <a:ext uri="{FF2B5EF4-FFF2-40B4-BE49-F238E27FC236}">
+                <a16:creationId xmlns:a16="http://schemas.microsoft.com/office/drawing/2014/main" id="{83F4B232-921A-4E9E-96BF-F85E50DCC20B}"/>
+              </a:ext>
+            </a:extLst>
+          </p:cNvPr>
+          <p:cNvSpPr/>
+          <p:nvPr/>
+        </p:nvSpPr>
+        <p:spPr>
+          <a:xfrm>
+            <a:off x="8127953" y="1698450"/>
+            <a:ext cx="2417354" cy="2408166"/>
+          </a:xfrm>
+          <a:prstGeom prst="rect">
+            <a:avLst/>
+          </a:prstGeom>
+          <a:solidFill>
+            <a:schemeClr val="accent6">
+              <a:alpha val="50000"/>
+            </a:schemeClr>
+          </a:solidFill>
+          <a:ln>
+            <a:noFill/>
+          </a:ln>
+          <a:effectLst>
+            <a:outerShdw blurRad="50800" dist="38100" dir="8100000" algn="tr" rotWithShape="0">
+              <a:prstClr val="black">
+                <a:alpha val="40000"/>
+              </a:prstClr>
+            </a:outerShdw>
+          </a:effectLst>
+        </p:spPr>
+        <p:style>
+          <a:lnRef idx="0">
+            <a:scrgbClr r="0" g="0" b="0"/>
+          </a:lnRef>
+          <a:fillRef idx="0">
+            <a:scrgbClr r="0" g="0" b="0"/>
+          </a:fillRef>
+          <a:effectRef idx="0">
+            <a:scrgbClr r="0" g="0" b="0"/>
+          </a:effectRef>
+          <a:fontRef idx="minor">
+            <a:schemeClr val="lt1"/>
+          </a:fontRef>
+        </p:style>
+        <p:txBody>
+          <a:bodyPr rtlCol="0" anchor="ctr"/>
+          <a:lstStyle/>
+          <a:p>
+            <a:pPr algn="ctr"/>
+            <a:endParaRPr lang="da-DK"/>
+          </a:p>
+        </p:txBody>
+      </p:sp>
+      <p:sp>
+        <p:nvSpPr>
+          <p:cNvPr id="7" name="Rektangel 6">
+            <a:extLst>
+              <a:ext uri="{FF2B5EF4-FFF2-40B4-BE49-F238E27FC236}">
+                <a16:creationId xmlns:a16="http://schemas.microsoft.com/office/drawing/2014/main" id="{AF3531E0-A825-49E8-BA58-A1740161FBAB}"/>
+              </a:ext>
+            </a:extLst>
+          </p:cNvPr>
+          <p:cNvSpPr/>
+          <p:nvPr/>
+        </p:nvSpPr>
+        <p:spPr>
+          <a:xfrm>
+            <a:off x="4882727" y="1698450"/>
+            <a:ext cx="2417354" cy="2408166"/>
+          </a:xfrm>
+          <a:prstGeom prst="rect">
+            <a:avLst/>
+          </a:prstGeom>
+          <a:solidFill>
+            <a:schemeClr val="accent1">
+              <a:alpha val="50000"/>
+            </a:schemeClr>
+          </a:solidFill>
+          <a:ln>
+            <a:noFill/>
+          </a:ln>
+          <a:effectLst>
+            <a:outerShdw blurRad="50800" dist="38100" dir="5400000" algn="t" rotWithShape="0">
+              <a:prstClr val="black">
+                <a:alpha val="40000"/>
+              </a:prstClr>
+            </a:outerShdw>
+          </a:effectLst>
+        </p:spPr>
+        <p:style>
+          <a:lnRef idx="0">
+            <a:scrgbClr r="0" g="0" b="0"/>
+          </a:lnRef>
+          <a:fillRef idx="0">
+            <a:scrgbClr r="0" g="0" b="0"/>
+          </a:fillRef>
+          <a:effectRef idx="0">
+            <a:scrgbClr r="0" g="0" b="0"/>
+          </a:effectRef>
+          <a:fontRef idx="minor">
+            <a:schemeClr val="lt1"/>
+          </a:fontRef>
+        </p:style>
+        <p:txBody>
+          <a:bodyPr rtlCol="0" anchor="ctr"/>
+          <a:lstStyle/>
+          <a:p>
+            <a:pPr algn="ctr"/>
+            <a:endParaRPr lang="da-DK"/>
+          </a:p>
+        </p:txBody>
+      </p:sp>
+      <p:sp>
+        <p:nvSpPr>
+          <p:cNvPr id="8" name="Tekstfelt 7">
+            <a:extLst>
+              <a:ext uri="{FF2B5EF4-FFF2-40B4-BE49-F238E27FC236}">
+                <a16:creationId xmlns:a16="http://schemas.microsoft.com/office/drawing/2014/main" id="{99A033B6-CFB2-4A08-9106-01281CA69BB0}"/>
+              </a:ext>
+            </a:extLst>
+          </p:cNvPr>
+          <p:cNvSpPr txBox="1"/>
+          <p:nvPr/>
+        </p:nvSpPr>
+        <p:spPr>
+          <a:xfrm>
+            <a:off x="1646693" y="1698450"/>
+            <a:ext cx="2417354" cy="369332"/>
+          </a:xfrm>
+          <a:prstGeom prst="rect">
+            <a:avLst/>
+          </a:prstGeom>
+          <a:noFill/>
+        </p:spPr>
+        <p:txBody>
+          <a:bodyPr wrap="square" rtlCol="0">
+            <a:spAutoFit/>
+          </a:bodyPr>
+          <a:lstStyle/>
+          <a:p>
+            <a:pPr algn="ctr"/>
+            <a:r>
+              <a:rPr lang="da-DK" dirty="0"/>
+              <a:t>Krav 1 – GUI</a:t>
+            </a:r>
+          </a:p>
+        </p:txBody>
+      </p:sp>
+      <p:sp>
+        <p:nvSpPr>
+          <p:cNvPr id="9" name="Tekstfelt 8">
+            <a:extLst>
+              <a:ext uri="{FF2B5EF4-FFF2-40B4-BE49-F238E27FC236}">
+                <a16:creationId xmlns:a16="http://schemas.microsoft.com/office/drawing/2014/main" id="{0A34C707-B007-4EBB-B1FE-C087C3324432}"/>
+              </a:ext>
+            </a:extLst>
+          </p:cNvPr>
+          <p:cNvSpPr txBox="1"/>
+          <p:nvPr/>
+        </p:nvSpPr>
+        <p:spPr>
+          <a:xfrm>
+            <a:off x="4882727" y="1698450"/>
+            <a:ext cx="2417354" cy="646331"/>
+          </a:xfrm>
+          <a:prstGeom prst="rect">
+            <a:avLst/>
+          </a:prstGeom>
+          <a:noFill/>
+        </p:spPr>
+        <p:txBody>
+          <a:bodyPr wrap="square" rtlCol="0">
+            <a:spAutoFit/>
+          </a:bodyPr>
+          <a:lstStyle/>
+          <a:p>
+            <a:pPr algn="ctr"/>
+            <a:r>
+              <a:rPr lang="da-DK" dirty="0"/>
+              <a:t>Krav 2 – </a:t>
+            </a:r>
+            <a:r>
+              <a:rPr lang="da-DK" dirty="0" err="1"/>
+              <a:t>Admini-strering</a:t>
+            </a:r>
+            <a:r>
+              <a:rPr lang="da-DK" dirty="0"/>
+              <a:t> af økonomi</a:t>
+            </a:r>
+          </a:p>
+        </p:txBody>
+      </p:sp>
+      <p:sp>
+        <p:nvSpPr>
+          <p:cNvPr id="10" name="Tekstfelt 9">
+            <a:extLst>
+              <a:ext uri="{FF2B5EF4-FFF2-40B4-BE49-F238E27FC236}">
+                <a16:creationId xmlns:a16="http://schemas.microsoft.com/office/drawing/2014/main" id="{431A63D1-ABC2-4E0E-82C3-FFF5EAAFBC9C}"/>
+              </a:ext>
+            </a:extLst>
+          </p:cNvPr>
+          <p:cNvSpPr txBox="1"/>
+          <p:nvPr/>
+        </p:nvSpPr>
+        <p:spPr>
+          <a:xfrm>
+            <a:off x="8127639" y="1698450"/>
+            <a:ext cx="2417354" cy="646331"/>
+          </a:xfrm>
+          <a:prstGeom prst="rect">
+            <a:avLst/>
+          </a:prstGeom>
+          <a:noFill/>
+        </p:spPr>
+        <p:txBody>
+          <a:bodyPr wrap="square" rtlCol="0">
+            <a:spAutoFit/>
+          </a:bodyPr>
+          <a:lstStyle/>
+          <a:p>
+            <a:pPr algn="ctr"/>
+            <a:r>
+              <a:rPr lang="da-DK" dirty="0"/>
+              <a:t>Krav 3 – Visning af økonomi </a:t>
+            </a:r>
+          </a:p>
+        </p:txBody>
+      </p:sp>
+      <p:cxnSp>
+        <p:nvCxnSpPr>
+          <p:cNvPr id="11" name="Lige forbindelse 10">
+            <a:extLst>
+              <a:ext uri="{FF2B5EF4-FFF2-40B4-BE49-F238E27FC236}">
+                <a16:creationId xmlns:a16="http://schemas.microsoft.com/office/drawing/2014/main" id="{ECAD9F03-FC44-4817-9969-6AB0F139C9E7}"/>
+              </a:ext>
+            </a:extLst>
+          </p:cNvPr>
+          <p:cNvCxnSpPr>
+            <a:cxnSpLocks/>
+          </p:cNvCxnSpPr>
+          <p:nvPr/>
+        </p:nvCxnSpPr>
+        <p:spPr>
+          <a:xfrm>
+            <a:off x="4882727" y="2414726"/>
+            <a:ext cx="2419735" cy="0"/>
+          </a:xfrm>
+          <a:prstGeom prst="line">
+            <a:avLst/>
+          </a:prstGeom>
+          <a:ln w="38100">
+            <a:solidFill>
+              <a:schemeClr val="tx1"/>
+            </a:solidFill>
+          </a:ln>
+        </p:spPr>
+        <p:style>
+          <a:lnRef idx="1">
+            <a:schemeClr val="accent1"/>
+          </a:lnRef>
+          <a:fillRef idx="0">
+            <a:schemeClr val="accent1"/>
+          </a:fillRef>
+          <a:effectRef idx="0">
+            <a:schemeClr val="accent1"/>
+          </a:effectRef>
+          <a:fontRef idx="minor">
+            <a:schemeClr val="tx1"/>
+          </a:fontRef>
+        </p:style>
+      </p:cxnSp>
+      <p:cxnSp>
+        <p:nvCxnSpPr>
+          <p:cNvPr id="12" name="Lige forbindelse 11">
+            <a:extLst>
+              <a:ext uri="{FF2B5EF4-FFF2-40B4-BE49-F238E27FC236}">
+                <a16:creationId xmlns:a16="http://schemas.microsoft.com/office/drawing/2014/main" id="{9B75A808-5819-4D6F-A8FA-B0346AB18469}"/>
+              </a:ext>
+            </a:extLst>
+          </p:cNvPr>
+          <p:cNvCxnSpPr/>
+          <p:nvPr/>
+        </p:nvCxnSpPr>
+        <p:spPr>
+          <a:xfrm>
+            <a:off x="1646693" y="2416205"/>
+            <a:ext cx="2417354" cy="0"/>
+          </a:xfrm>
+          <a:prstGeom prst="line">
+            <a:avLst/>
+          </a:prstGeom>
+          <a:ln w="38100">
+            <a:solidFill>
+              <a:schemeClr val="tx1"/>
+            </a:solidFill>
+          </a:ln>
+        </p:spPr>
+        <p:style>
+          <a:lnRef idx="1">
+            <a:schemeClr val="accent1"/>
+          </a:lnRef>
+          <a:fillRef idx="0">
+            <a:schemeClr val="accent1"/>
+          </a:fillRef>
+          <a:effectRef idx="0">
+            <a:schemeClr val="accent1"/>
+          </a:effectRef>
+          <a:fontRef idx="minor">
+            <a:schemeClr val="tx1"/>
+          </a:fontRef>
+        </p:style>
+      </p:cxnSp>
+      <p:cxnSp>
+        <p:nvCxnSpPr>
+          <p:cNvPr id="13" name="Lige forbindelse 12">
+            <a:extLst>
+              <a:ext uri="{FF2B5EF4-FFF2-40B4-BE49-F238E27FC236}">
+                <a16:creationId xmlns:a16="http://schemas.microsoft.com/office/drawing/2014/main" id="{93BC6E56-0F15-4961-BFAB-0552EF57B9F6}"/>
+              </a:ext>
+            </a:extLst>
+          </p:cNvPr>
+          <p:cNvCxnSpPr/>
+          <p:nvPr/>
+        </p:nvCxnSpPr>
+        <p:spPr>
+          <a:xfrm>
+            <a:off x="8127639" y="2414726"/>
+            <a:ext cx="2417354" cy="0"/>
+          </a:xfrm>
+          <a:prstGeom prst="line">
+            <a:avLst/>
+          </a:prstGeom>
+          <a:ln w="38100">
+            <a:solidFill>
+              <a:schemeClr val="tx1"/>
+            </a:solidFill>
+          </a:ln>
+        </p:spPr>
+        <p:style>
+          <a:lnRef idx="1">
+            <a:schemeClr val="accent1"/>
+          </a:lnRef>
+          <a:fillRef idx="0">
+            <a:schemeClr val="accent1"/>
+          </a:fillRef>
+          <a:effectRef idx="0">
+            <a:schemeClr val="accent1"/>
+          </a:effectRef>
+          <a:fontRef idx="minor">
+            <a:schemeClr val="tx1"/>
+          </a:fontRef>
+        </p:style>
+      </p:cxnSp>
+      <p:sp>
+        <p:nvSpPr>
+          <p:cNvPr id="14" name="Tekstfelt 13">
+            <a:extLst>
+              <a:ext uri="{FF2B5EF4-FFF2-40B4-BE49-F238E27FC236}">
+                <a16:creationId xmlns:a16="http://schemas.microsoft.com/office/drawing/2014/main" id="{7886E4F1-508D-465D-862A-C7C429A5C09C}"/>
+              </a:ext>
+            </a:extLst>
+          </p:cNvPr>
+          <p:cNvSpPr txBox="1"/>
+          <p:nvPr/>
+        </p:nvSpPr>
+        <p:spPr>
+          <a:xfrm>
+            <a:off x="1703843" y="2543175"/>
+            <a:ext cx="2296657" cy="1077218"/>
+          </a:xfrm>
+          <a:prstGeom prst="rect">
+            <a:avLst/>
+          </a:prstGeom>
+          <a:noFill/>
+        </p:spPr>
+        <p:txBody>
+          <a:bodyPr wrap="square" rtlCol="0">
+            <a:spAutoFit/>
+          </a:bodyPr>
+          <a:lstStyle/>
+          <a:p>
+            <a:pPr marL="285750" indent="-285750">
+              <a:buFont typeface="Wingdings" panose="05000000000000000000" pitchFamily="2" charset="2"/>
+              <a:buChar char="ü"/>
+            </a:pPr>
+            <a:r>
+              <a:rPr lang="da-DK" sz="1600" dirty="0"/>
+              <a:t>Indtaste oplysninger</a:t>
+            </a:r>
+          </a:p>
+          <a:p>
+            <a:pPr marL="285750" indent="-285750">
+              <a:buFont typeface="Wingdings" panose="05000000000000000000" pitchFamily="2" charset="2"/>
+              <a:buChar char="ü"/>
+            </a:pPr>
+            <a:r>
+              <a:rPr lang="da-DK" sz="1600" dirty="0"/>
+              <a:t>Oprette kategorier</a:t>
+            </a:r>
+          </a:p>
+          <a:p>
+            <a:pPr marL="285750" indent="-285750">
+              <a:buFont typeface="Wingdings" panose="05000000000000000000" pitchFamily="2" charset="2"/>
+              <a:buChar char="ü"/>
+            </a:pPr>
+            <a:r>
+              <a:rPr lang="da-DK" sz="1600" dirty="0"/>
+              <a:t>Vise oplysninger</a:t>
+            </a:r>
+            <a:endParaRPr lang="da-DK" sz="200" dirty="0"/>
+          </a:p>
+          <a:p>
+            <a:pPr marL="285750" indent="-285750">
+              <a:buFont typeface="Wingdings" panose="05000000000000000000" pitchFamily="2" charset="2"/>
+              <a:buChar char="q"/>
+            </a:pPr>
+            <a:endParaRPr lang="da-DK" sz="1600" dirty="0"/>
+          </a:p>
+        </p:txBody>
+      </p:sp>
+      <p:sp>
+        <p:nvSpPr>
+          <p:cNvPr id="15" name="Tekstfelt 14">
+            <a:extLst>
+              <a:ext uri="{FF2B5EF4-FFF2-40B4-BE49-F238E27FC236}">
+                <a16:creationId xmlns:a16="http://schemas.microsoft.com/office/drawing/2014/main" id="{AF94BBE9-A1BF-4BB9-BD0A-EEDE34F0EE6F}"/>
+              </a:ext>
+            </a:extLst>
+          </p:cNvPr>
+          <p:cNvSpPr txBox="1"/>
+          <p:nvPr/>
+        </p:nvSpPr>
+        <p:spPr>
+          <a:xfrm>
+            <a:off x="4943075" y="2540474"/>
+            <a:ext cx="2296657" cy="584775"/>
+          </a:xfrm>
+          <a:prstGeom prst="rect">
+            <a:avLst/>
+          </a:prstGeom>
+          <a:noFill/>
+        </p:spPr>
+        <p:txBody>
+          <a:bodyPr wrap="square" rtlCol="0">
+            <a:spAutoFit/>
+          </a:bodyPr>
+          <a:lstStyle/>
+          <a:p>
+            <a:pPr marL="285750" indent="-285750">
+              <a:buFont typeface="Wingdings" panose="05000000000000000000" pitchFamily="2" charset="2"/>
+              <a:buChar char="ü"/>
+            </a:pPr>
+            <a:r>
+              <a:rPr lang="da-DK" sz="1600" dirty="0"/>
+              <a:t>Udregne kontosaldo</a:t>
+            </a:r>
+          </a:p>
+          <a:p>
+            <a:pPr marL="285750" indent="-285750">
+              <a:buFont typeface="Wingdings" panose="05000000000000000000" pitchFamily="2" charset="2"/>
+              <a:buChar char="ü"/>
+            </a:pPr>
+            <a:r>
+              <a:rPr lang="da-DK" sz="1600" dirty="0"/>
+              <a:t>Løn fra arbejde</a:t>
+            </a:r>
+          </a:p>
+        </p:txBody>
+      </p:sp>
+      <p:sp>
+        <p:nvSpPr>
+          <p:cNvPr id="16" name="Tekstfelt 15">
+            <a:extLst>
+              <a:ext uri="{FF2B5EF4-FFF2-40B4-BE49-F238E27FC236}">
+                <a16:creationId xmlns:a16="http://schemas.microsoft.com/office/drawing/2014/main" id="{36390761-7226-44AD-9236-8184FD09900B}"/>
+              </a:ext>
+            </a:extLst>
+          </p:cNvPr>
+          <p:cNvSpPr txBox="1"/>
+          <p:nvPr/>
+        </p:nvSpPr>
+        <p:spPr>
+          <a:xfrm>
+            <a:off x="8191500" y="2540474"/>
+            <a:ext cx="2296657" cy="1323439"/>
+          </a:xfrm>
+          <a:prstGeom prst="rect">
+            <a:avLst/>
+          </a:prstGeom>
+          <a:noFill/>
+        </p:spPr>
+        <p:txBody>
+          <a:bodyPr wrap="square" rtlCol="0">
+            <a:spAutoFit/>
+          </a:bodyPr>
+          <a:lstStyle/>
+          <a:p>
+            <a:pPr marL="285750" indent="-285750">
+              <a:buFont typeface="Wingdings" panose="05000000000000000000" pitchFamily="2" charset="2"/>
+              <a:buChar char="ü"/>
+            </a:pPr>
+            <a:r>
+              <a:rPr lang="da-DK" sz="1600" dirty="0"/>
+              <a:t>Nuværende konto-saldo</a:t>
+            </a:r>
+          </a:p>
+          <a:p>
+            <a:pPr marL="285750" indent="-285750">
+              <a:buFont typeface="Wingdings" panose="05000000000000000000" pitchFamily="2" charset="2"/>
+              <a:buChar char="ü"/>
+            </a:pPr>
+            <a:r>
+              <a:rPr lang="da-DK" sz="1600" dirty="0"/>
+              <a:t>Kontosaldo for forskellige dage på graf</a:t>
+            </a:r>
+          </a:p>
+        </p:txBody>
+      </p:sp>
+    </p:spTree>
+    <p:extLst>
+      <p:ext uri="{BB962C8B-B14F-4D97-AF65-F5344CB8AC3E}">
+        <p14:creationId xmlns:p14="http://schemas.microsoft.com/office/powerpoint/2010/main" val="3234497840"/>
       </p:ext>
     </p:extLst>
   </p:cSld>

</xml_diff>

<commit_message>
Should be finished for exam
Changed a bit in the PowerPoint and tested the program for the exam, which should be good to go.
</commit_message>
<xml_diff>
--- a/Eksamensprojekt - Max/Præsentation/Præsentation af eksamensprojekt.pptx
+++ b/Eksamensprojekt - Max/Præsentation/Præsentation af eksamensprojekt.pptx
@@ -150,21 +150,6 @@
 </p:cmAuthorLst>
 </file>
 
-<file path=ppt/comments/comment1.xml><?xml version="1.0" encoding="utf-8"?>
-<p:cmLst xmlns:a="http://schemas.openxmlformats.org/drawingml/2006/main" xmlns:r="http://schemas.openxmlformats.org/officeDocument/2006/relationships" xmlns:p="http://schemas.openxmlformats.org/presentationml/2006/main">
-  <p:cm authorId="1" dt="2020-06-10T14:22:47.367" idx="2">
-    <p:pos x="5213" y="2502"/>
-    <p:text>Max Hansen	10-06-2020
-Flowdiagram</p:text>
-    <p:extLst>
-      <p:ext uri="{C676402C-5697-4E1C-873F-D02D1690AC5C}">
-        <p15:threadingInfo xmlns:p15="http://schemas.microsoft.com/office/powerpoint/2012/main" timeZoneBias="-120"/>
-      </p:ext>
-    </p:extLst>
-  </p:cm>
-</p:cmLst>
-</file>
-
 <file path=ppt/handoutMasters/handoutMaster1.xml><?xml version="1.0" encoding="utf-8"?>
 <p:handoutMaster xmlns:a="http://schemas.openxmlformats.org/drawingml/2006/main" xmlns:r="http://schemas.openxmlformats.org/officeDocument/2006/relationships" xmlns:p="http://schemas.openxmlformats.org/presentationml/2006/main">
   <p:cSld>
@@ -259,7 +244,7 @@
           <a:p>
             <a:fld id="{496FCD50-C1A0-482B-BC86-90B92CB2FE42}" type="datetimeFigureOut">
               <a:rPr lang="da-DK" smtClean="0"/>
-              <a:t>21-06-2020</a:t>
+              <a:t>22-06-2020</a:t>
             </a:fld>
             <a:endParaRPr lang="da-DK"/>
           </a:p>
@@ -437,7 +422,7 @@
           <a:p>
             <a:fld id="{86FDA1C0-1334-4D8B-BA9D-24D0A591AB05}" type="datetimeFigureOut">
               <a:rPr lang="da-DK" smtClean="0"/>
-              <a:t>21-06-2020</a:t>
+              <a:t>22-06-2020</a:t>
             </a:fld>
             <a:endParaRPr lang="da-DK"/>
           </a:p>
@@ -5397,7 +5382,7 @@
           <a:p>
             <a:fld id="{FF082D74-0F04-403B-AC9F-887F607CB20D}" type="datetimeFigureOut">
               <a:rPr lang="en-US" smtClean="0"/>
-              <a:t>6/21/2020</a:t>
+              <a:t>6/22/2020</a:t>
             </a:fld>
             <a:endParaRPr lang="en-US"/>
           </a:p>
@@ -15228,7 +15213,7 @@
           <a:p>
             <a:fld id="{FF082D74-0F04-403B-AC9F-887F607CB20D}" type="datetimeFigureOut">
               <a:rPr lang="en-US" smtClean="0"/>
-              <a:t>6/21/2020</a:t>
+              <a:t>6/22/2020</a:t>
             </a:fld>
             <a:endParaRPr lang="en-US"/>
           </a:p>
@@ -19909,8 +19894,8 @@
         </p:nvSpPr>
         <p:spPr>
           <a:xfrm>
-            <a:off x="1370693" y="1734672"/>
-            <a:ext cx="9440034" cy="3388656"/>
+            <a:off x="1384372" y="1473441"/>
+            <a:ext cx="9440034" cy="3911118"/>
           </a:xfrm>
         </p:spPr>
         <p:txBody>
@@ -20147,6 +20132,16 @@
             <a:r>
               <a:rPr lang="da-DK" dirty="0"/>
               <a:t>Forbedringer af programmet</a:t>
+            </a:r>
+          </a:p>
+          <a:p>
+            <a:pPr marL="457200" indent="-457200">
+              <a:buFont typeface="Courier New" panose="02070309020205020404" pitchFamily="49" charset="0"/>
+              <a:buChar char="o"/>
+            </a:pPr>
+            <a:r>
+              <a:rPr lang="da-DK" dirty="0"/>
+              <a:t>Opsummering</a:t>
             </a:r>
           </a:p>
         </p:txBody>
@@ -21486,6 +21481,41 @@
           </a:effectLst>
         </p:spPr>
       </p:pic>
+      <p:sp>
+        <p:nvSpPr>
+          <p:cNvPr id="2" name="Tekstfelt 1">
+            <a:extLst>
+              <a:ext uri="{FF2B5EF4-FFF2-40B4-BE49-F238E27FC236}">
+                <a16:creationId xmlns:a16="http://schemas.microsoft.com/office/drawing/2014/main" id="{30D4BCB5-31D2-4710-845E-4AA4013D6BA2}"/>
+              </a:ext>
+            </a:extLst>
+          </p:cNvPr>
+          <p:cNvSpPr txBox="1"/>
+          <p:nvPr/>
+        </p:nvSpPr>
+        <p:spPr>
+          <a:xfrm>
+            <a:off x="495655" y="1025495"/>
+            <a:ext cx="3478139" cy="369332"/>
+          </a:xfrm>
+          <a:prstGeom prst="rect">
+            <a:avLst/>
+          </a:prstGeom>
+          <a:noFill/>
+        </p:spPr>
+        <p:txBody>
+          <a:bodyPr wrap="square" rtlCol="0">
+            <a:spAutoFit/>
+          </a:bodyPr>
+          <a:lstStyle/>
+          <a:p>
+            <a:r>
+              <a:rPr lang="da-DK" dirty="0"/>
+              <a:t>Login</a:t>
+            </a:r>
+          </a:p>
+        </p:txBody>
+      </p:sp>
     </p:spTree>
     <p:extLst>
       <p:ext uri="{BB962C8B-B14F-4D97-AF65-F5344CB8AC3E}">
@@ -21815,6 +21845,41 @@
           </a:p>
         </p:txBody>
       </p:sp>
+      <p:sp>
+        <p:nvSpPr>
+          <p:cNvPr id="5" name="Tekstfelt 4">
+            <a:extLst>
+              <a:ext uri="{FF2B5EF4-FFF2-40B4-BE49-F238E27FC236}">
+                <a16:creationId xmlns:a16="http://schemas.microsoft.com/office/drawing/2014/main" id="{35A3898D-5C9B-4BDC-ABA0-1DDA2318DD7D}"/>
+              </a:ext>
+            </a:extLst>
+          </p:cNvPr>
+          <p:cNvSpPr txBox="1"/>
+          <p:nvPr/>
+        </p:nvSpPr>
+        <p:spPr>
+          <a:xfrm>
+            <a:off x="495655" y="1025495"/>
+            <a:ext cx="3478139" cy="369332"/>
+          </a:xfrm>
+          <a:prstGeom prst="rect">
+            <a:avLst/>
+          </a:prstGeom>
+          <a:noFill/>
+        </p:spPr>
+        <p:txBody>
+          <a:bodyPr wrap="square" rtlCol="0">
+            <a:spAutoFit/>
+          </a:bodyPr>
+          <a:lstStyle/>
+          <a:p>
+            <a:r>
+              <a:rPr lang="da-DK" dirty="0"/>
+              <a:t>Sign up</a:t>
+            </a:r>
+          </a:p>
+        </p:txBody>
+      </p:sp>
     </p:spTree>
     <p:extLst>
       <p:ext uri="{BB962C8B-B14F-4D97-AF65-F5344CB8AC3E}">
@@ -22134,7 +22199,7 @@
             </a:pPr>
             <a:r>
               <a:rPr lang="da-DK" dirty="0"/>
-              <a:t>Bruge kategorierne til inddeling</a:t>
+              <a:t>Bruge kategorierne til inddeling, samt gør kategorierne personlige</a:t>
             </a:r>
           </a:p>
           <a:p>

</xml_diff>